<commit_message>
added intrest in introduction slides
</commit_message>
<xml_diff>
--- a/Session 1 - Programing with Python/Introduction Slides.pptx
+++ b/Session 1 - Programing with Python/Introduction Slides.pptx
@@ -3074,7 +3074,7 @@
           <a:p>
             <a:fld id="{F4A947EE-A121-42C9-ABDB-BDC9D4DE20E1}" type="datetimeFigureOut">
               <a:rPr lang="en-GB" smtClean="0"/>
-              <a:t>04/07/2017</a:t>
+              <a:t>05/07/2017</a:t>
             </a:fld>
             <a:endParaRPr lang="en-GB"/>
           </a:p>
@@ -3621,7 +3621,7 @@
           <a:p>
             <a:fld id="{2510991C-534D-4766-BDB3-463820CE304D}" type="datetimeFigureOut">
               <a:rPr lang="en-GB" smtClean="0"/>
-              <a:t>04/07/2017</a:t>
+              <a:t>05/07/2017</a:t>
             </a:fld>
             <a:endParaRPr lang="en-GB"/>
           </a:p>
@@ -3811,7 +3811,7 @@
           <a:p>
             <a:fld id="{2510991C-534D-4766-BDB3-463820CE304D}" type="datetimeFigureOut">
               <a:rPr lang="en-GB" smtClean="0"/>
-              <a:t>04/07/2017</a:t>
+              <a:t>05/07/2017</a:t>
             </a:fld>
             <a:endParaRPr lang="en-GB"/>
           </a:p>
@@ -3991,7 +3991,7 @@
           <a:p>
             <a:fld id="{2510991C-534D-4766-BDB3-463820CE304D}" type="datetimeFigureOut">
               <a:rPr lang="en-GB" smtClean="0"/>
-              <a:t>04/07/2017</a:t>
+              <a:t>05/07/2017</a:t>
             </a:fld>
             <a:endParaRPr lang="en-GB"/>
           </a:p>
@@ -4161,7 +4161,7 @@
           <a:p>
             <a:fld id="{2510991C-534D-4766-BDB3-463820CE304D}" type="datetimeFigureOut">
               <a:rPr lang="en-GB" smtClean="0"/>
-              <a:t>04/07/2017</a:t>
+              <a:t>05/07/2017</a:t>
             </a:fld>
             <a:endParaRPr lang="en-GB"/>
           </a:p>
@@ -4417,7 +4417,7 @@
           <a:p>
             <a:fld id="{2510991C-534D-4766-BDB3-463820CE304D}" type="datetimeFigureOut">
               <a:rPr lang="en-GB" smtClean="0"/>
-              <a:t>04/07/2017</a:t>
+              <a:t>05/07/2017</a:t>
             </a:fld>
             <a:endParaRPr lang="en-GB"/>
           </a:p>
@@ -4705,7 +4705,7 @@
           <a:p>
             <a:fld id="{2510991C-534D-4766-BDB3-463820CE304D}" type="datetimeFigureOut">
               <a:rPr lang="en-GB" smtClean="0"/>
-              <a:t>04/07/2017</a:t>
+              <a:t>05/07/2017</a:t>
             </a:fld>
             <a:endParaRPr lang="en-GB"/>
           </a:p>
@@ -5143,7 +5143,7 @@
           <a:p>
             <a:fld id="{2510991C-534D-4766-BDB3-463820CE304D}" type="datetimeFigureOut">
               <a:rPr lang="en-GB" smtClean="0"/>
-              <a:t>04/07/2017</a:t>
+              <a:t>05/07/2017</a:t>
             </a:fld>
             <a:endParaRPr lang="en-GB"/>
           </a:p>
@@ -5261,7 +5261,7 @@
           <a:p>
             <a:fld id="{2510991C-534D-4766-BDB3-463820CE304D}" type="datetimeFigureOut">
               <a:rPr lang="en-GB" smtClean="0"/>
-              <a:t>04/07/2017</a:t>
+              <a:t>05/07/2017</a:t>
             </a:fld>
             <a:endParaRPr lang="en-GB"/>
           </a:p>
@@ -5356,7 +5356,7 @@
           <a:p>
             <a:fld id="{2510991C-534D-4766-BDB3-463820CE304D}" type="datetimeFigureOut">
               <a:rPr lang="en-GB" smtClean="0"/>
-              <a:t>04/07/2017</a:t>
+              <a:t>05/07/2017</a:t>
             </a:fld>
             <a:endParaRPr lang="en-GB"/>
           </a:p>
@@ -5712,7 +5712,7 @@
           <a:p>
             <a:fld id="{2510991C-534D-4766-BDB3-463820CE304D}" type="datetimeFigureOut">
               <a:rPr lang="en-GB" smtClean="0"/>
-              <a:t>04/07/2017</a:t>
+              <a:t>05/07/2017</a:t>
             </a:fld>
             <a:endParaRPr lang="en-GB"/>
           </a:p>
@@ -6020,7 +6020,7 @@
           <a:p>
             <a:fld id="{2510991C-534D-4766-BDB3-463820CE304D}" type="datetimeFigureOut">
               <a:rPr lang="en-GB" smtClean="0"/>
-              <a:t>04/07/2017</a:t>
+              <a:t>05/07/2017</a:t>
             </a:fld>
             <a:endParaRPr lang="en-GB"/>
           </a:p>
@@ -6256,7 +6256,7 @@
           <a:p>
             <a:fld id="{2510991C-534D-4766-BDB3-463820CE304D}" type="datetimeFigureOut">
               <a:rPr lang="en-GB" smtClean="0"/>
-              <a:t>04/07/2017</a:t>
+              <a:t>05/07/2017</a:t>
             </a:fld>
             <a:endParaRPr lang="en-GB"/>
           </a:p>
@@ -7551,7 +7551,7 @@
                   </a:schemeClr>
                 </a:solidFill>
               </a:rPr>
-              <a:t>Interest: ????????????????</a:t>
+              <a:t>Interest: science, philosophy, politics</a:t>
             </a:r>
           </a:p>
         </p:txBody>
@@ -9742,18 +9742,18 @@
 
 <file path=customXml/item1.xml><?xml version="1.0" encoding="utf-8"?>
 <Control xmlns="http://schemas.microsoft.com/VisualStudio/2011/storyboarding/control">
-  <Id Name="System.Storyboarding.Backgrounds.DesktopTaskbar" Revision="1" Stencil="System.Storyboarding.Backgrounds" StencilVersion="0.1"/>
+  <Id Name="System.Storyboarding.Backgrounds.WebBrowser" Revision="1" Stencil="System.Storyboarding.Backgrounds" StencilVersion="0.1"/>
 </Control>
 </file>
 
 <file path=customXml/item2.xml><?xml version="1.0" encoding="utf-8"?>
 <Control xmlns="http://schemas.microsoft.com/VisualStudio/2011/storyboarding/control">
-  <Id Name="System.Storyboarding.Backgrounds.WebBrowser" Revision="1" Stencil="System.Storyboarding.Backgrounds" StencilVersion="0.1"/>
+  <Id Name="System.Storyboarding.Backgrounds.DesktopTaskbar" Revision="1" Stencil="System.Storyboarding.Backgrounds" StencilVersion="0.1"/>
 </Control>
 </file>
 
 <file path=customXml/itemProps1.xml><?xml version="1.0" encoding="utf-8"?>
-<ds:datastoreItem xmlns:ds="http://schemas.openxmlformats.org/officeDocument/2006/customXml" ds:itemID="{2F22A196-DEB6-43B5-ACAB-ACB66E18493F}">
+<ds:datastoreItem xmlns:ds="http://schemas.openxmlformats.org/officeDocument/2006/customXml" ds:itemID="{C0AA30DE-6CBB-4586-BA23-16B50AD7EE0A}">
   <ds:schemaRefs>
     <ds:schemaRef ds:uri="http://schemas.microsoft.com/VisualStudio/2011/storyboarding/control"/>
   </ds:schemaRefs>
@@ -9761,7 +9761,7 @@
 </file>
 
 <file path=customXml/itemProps2.xml><?xml version="1.0" encoding="utf-8"?>
-<ds:datastoreItem xmlns:ds="http://schemas.openxmlformats.org/officeDocument/2006/customXml" ds:itemID="{C0AA30DE-6CBB-4586-BA23-16B50AD7EE0A}">
+<ds:datastoreItem xmlns:ds="http://schemas.openxmlformats.org/officeDocument/2006/customXml" ds:itemID="{2F22A196-DEB6-43B5-ACAB-ACB66E18493F}">
   <ds:schemaRefs>
     <ds:schemaRef ds:uri="http://schemas.microsoft.com/VisualStudio/2011/storyboarding/control"/>
   </ds:schemaRefs>

</xml_diff>